<commit_message>
kick of session - ppt
</commit_message>
<xml_diff>
--- a/Fraud_review_detection_web_app_ProjectPlan.pptx
+++ b/Fraud_review_detection_web_app_ProjectPlan.pptx
@@ -31660,12 +31660,20 @@
               <a:buChar char=""/>
             </a:pPr>
             <a:r>
+              <a:rPr lang="en-US" dirty="0" smtClean="0">
+                <a:solidFill>
+                  <a:schemeClr val="tx1"/>
+                </a:solidFill>
+              </a:rPr>
+              <a:t>BABINDAS </a:t>
+            </a:r>
+            <a:r>
               <a:rPr lang="en-US" dirty="0">
                 <a:solidFill>
                   <a:schemeClr val="tx1"/>
                 </a:solidFill>
               </a:rPr>
-              <a:t>BIBINDAS KIZHAKKE KAMMIL (100940754)</a:t>
+              <a:t>KIZHAKKE KAMMIL (100940754)</a:t>
             </a:r>
           </a:p>
           <a:p>
@@ -31686,7 +31694,7 @@
             <a:pPr>
               <a:buChar char=""/>
             </a:pPr>
-            <a:endParaRPr lang="en-US">
+            <a:endParaRPr lang="en-US" dirty="0">
               <a:solidFill>
                 <a:schemeClr val="tx1"/>
               </a:solidFill>

</xml_diff>

<commit_message>
kick_off session - ppt
</commit_message>
<xml_diff>
--- a/Fraud_review_detection_web_app_ProjectPlan.pptx
+++ b/Fraud_review_detection_web_app_ProjectPlan.pptx
@@ -31542,7 +31542,7 @@
           <a:p>
             <a:pPr algn="r"/>
             <a:r>
-              <a:rPr lang="en-US" sz="3600">
+              <a:rPr lang="en-US" sz="3600" dirty="0">
                 <a:solidFill>
                   <a:schemeClr val="tx1"/>
                 </a:solidFill>
@@ -33949,7 +33949,7 @@
         </p:blipFill>
         <p:spPr>
           <a:xfrm>
-            <a:off x="8495929" y="4047740"/>
+            <a:off x="7681603" y="4013139"/>
             <a:ext cx="1940580" cy="1181388"/>
           </a:xfrm>
           <a:prstGeom prst="rect">
@@ -33979,7 +33979,7 @@
         </p:blipFill>
         <p:spPr>
           <a:xfrm>
-            <a:off x="6947067" y="4337681"/>
+            <a:off x="6452962" y="4266185"/>
             <a:ext cx="1361303" cy="704581"/>
           </a:xfrm>
           <a:prstGeom prst="rect">
@@ -34038,7 +34038,7 @@
         </p:blipFill>
         <p:spPr>
           <a:xfrm>
-            <a:off x="10676920" y="4179451"/>
+            <a:off x="10699484" y="4095650"/>
             <a:ext cx="1408386" cy="900047"/>
           </a:xfrm>
           <a:prstGeom prst="rect">
@@ -34243,8 +34243,8 @@
         </p:nvCxnSpPr>
         <p:spPr>
           <a:xfrm>
-            <a:off x="7627719" y="3474718"/>
-            <a:ext cx="3753394" cy="0"/>
+            <a:off x="6949440" y="3474716"/>
+            <a:ext cx="4431673" cy="2"/>
           </a:xfrm>
           <a:prstGeom prst="line">
             <a:avLst/>
@@ -34273,7 +34273,7 @@
         </p:nvCxnSpPr>
         <p:spPr>
           <a:xfrm>
-            <a:off x="7627719" y="3474718"/>
+            <a:off x="6949440" y="3474716"/>
             <a:ext cx="0" cy="450149"/>
           </a:xfrm>
           <a:prstGeom prst="straightConnector1">
@@ -34306,7 +34306,7 @@
         </p:nvCxnSpPr>
         <p:spPr>
           <a:xfrm>
-            <a:off x="9474210" y="3474717"/>
+            <a:off x="8828142" y="3474716"/>
             <a:ext cx="0" cy="450149"/>
           </a:xfrm>
           <a:prstGeom prst="straightConnector1">
@@ -34393,6 +34393,69 @@
           </a:p>
         </p:txBody>
       </p:sp>
+      <p:pic>
+        <p:nvPicPr>
+          <p:cNvPr id="3" name="Picture 2"/>
+          <p:cNvPicPr>
+            <a:picLocks noChangeAspect="1"/>
+          </p:cNvPicPr>
+          <p:nvPr/>
+        </p:nvPicPr>
+        <p:blipFill>
+          <a:blip r:embed="rId11" cstate="print">
+            <a:extLst>
+              <a:ext uri="{28A0092B-C50C-407E-A947-70E740481C1C}">
+                <a14:useLocalDpi xmlns:a14="http://schemas.microsoft.com/office/drawing/2010/main" val="0"/>
+              </a:ext>
+            </a:extLst>
+          </a:blip>
+          <a:stretch>
+            <a:fillRect/>
+          </a:stretch>
+        </p:blipFill>
+        <p:spPr>
+          <a:xfrm>
+            <a:off x="9238886" y="4095527"/>
+            <a:ext cx="1509486" cy="849086"/>
+          </a:xfrm>
+          <a:prstGeom prst="rect">
+            <a:avLst/>
+          </a:prstGeom>
+        </p:spPr>
+      </p:pic>
+      <p:cxnSp>
+        <p:nvCxnSpPr>
+          <p:cNvPr id="27" name="Straight Arrow Connector 26"/>
+          <p:cNvCxnSpPr/>
+          <p:nvPr/>
+        </p:nvCxnSpPr>
+        <p:spPr>
+          <a:xfrm>
+            <a:off x="9953451" y="3474716"/>
+            <a:ext cx="0" cy="450149"/>
+          </a:xfrm>
+          <a:prstGeom prst="straightConnector1">
+            <a:avLst/>
+          </a:prstGeom>
+          <a:ln>
+            <a:tailEnd type="triangle"/>
+          </a:ln>
+        </p:spPr>
+        <p:style>
+          <a:lnRef idx="1">
+            <a:schemeClr val="accent1"/>
+          </a:lnRef>
+          <a:fillRef idx="0">
+            <a:schemeClr val="accent1"/>
+          </a:fillRef>
+          <a:effectRef idx="0">
+            <a:schemeClr val="accent1"/>
+          </a:effectRef>
+          <a:fontRef idx="minor">
+            <a:schemeClr val="tx1"/>
+          </a:fontRef>
+        </p:style>
+      </p:cxnSp>
     </p:spTree>
     <p:extLst>
       <p:ext uri="{BB962C8B-B14F-4D97-AF65-F5344CB8AC3E}">
@@ -34793,7 +34856,7 @@
       </p:sp>
       <p:pic>
         <p:nvPicPr>
-          <p:cNvPr id="10" name="Picture 9"/>
+          <p:cNvPr id="15" name="Picture 14"/>
           <p:cNvPicPr>
             <a:picLocks noChangeAspect="1"/>
           </p:cNvPicPr>
@@ -34813,7 +34876,7 @@
         </p:blipFill>
         <p:spPr>
           <a:xfrm>
-            <a:off x="8105996" y="3608532"/>
+            <a:off x="8361987" y="3718491"/>
             <a:ext cx="1940580" cy="1181388"/>
           </a:xfrm>
           <a:prstGeom prst="rect">
@@ -34823,7 +34886,7 @@
       </p:pic>
       <p:pic>
         <p:nvPicPr>
-          <p:cNvPr id="11" name="Picture 10"/>
+          <p:cNvPr id="16" name="Picture 15"/>
           <p:cNvPicPr>
             <a:picLocks noChangeAspect="1"/>
           </p:cNvPicPr>
@@ -34843,7 +34906,7 @@
         </p:blipFill>
         <p:spPr>
           <a:xfrm>
-            <a:off x="6554581" y="3846936"/>
+            <a:off x="6411637" y="3765130"/>
             <a:ext cx="1361303" cy="704581"/>
           </a:xfrm>
           <a:prstGeom prst="rect">
@@ -34853,7 +34916,7 @@
       </p:pic>
       <p:pic>
         <p:nvPicPr>
-          <p:cNvPr id="12" name="Picture 11"/>
+          <p:cNvPr id="17" name="Picture 16"/>
           <p:cNvPicPr>
             <a:picLocks noChangeAspect="1"/>
           </p:cNvPicPr>
@@ -34872,7 +34935,7 @@
         </p:blipFill>
         <p:spPr>
           <a:xfrm>
-            <a:off x="10572416" y="5440593"/>
+            <a:off x="8734590" y="5096249"/>
             <a:ext cx="1408386" cy="566499"/>
           </a:xfrm>
           <a:prstGeom prst="rect">
@@ -34882,7 +34945,7 @@
       </p:pic>
       <p:pic>
         <p:nvPicPr>
-          <p:cNvPr id="13" name="Picture 12"/>
+          <p:cNvPr id="18" name="Picture 17"/>
           <p:cNvPicPr>
             <a:picLocks noChangeAspect="1"/>
           </p:cNvPicPr>
@@ -34902,7 +34965,7 @@
         </p:blipFill>
         <p:spPr>
           <a:xfrm>
-            <a:off x="10572417" y="3608532"/>
+            <a:off x="6491215" y="4938216"/>
             <a:ext cx="1408386" cy="900047"/>
           </a:xfrm>
           <a:prstGeom prst="rect">
@@ -34912,13 +34975,13 @@
       </p:pic>
       <p:sp>
         <p:nvSpPr>
-          <p:cNvPr id="14" name="TextBox 13"/>
+          <p:cNvPr id="19" name="TextBox 18"/>
           <p:cNvSpPr txBox="1"/>
           <p:nvPr/>
         </p:nvSpPr>
         <p:spPr>
           <a:xfrm>
-            <a:off x="11013670" y="4789920"/>
+            <a:off x="8099047" y="5124918"/>
             <a:ext cx="525879" cy="369332"/>
           </a:xfrm>
           <a:prstGeom prst="rect">
@@ -34939,6 +35002,36 @@
           </a:p>
         </p:txBody>
       </p:sp>
+      <p:pic>
+        <p:nvPicPr>
+          <p:cNvPr id="20" name="Picture 19"/>
+          <p:cNvPicPr>
+            <a:picLocks noChangeAspect="1"/>
+          </p:cNvPicPr>
+          <p:nvPr/>
+        </p:nvPicPr>
+        <p:blipFill>
+          <a:blip r:embed="rId6" cstate="print">
+            <a:extLst>
+              <a:ext uri="{28A0092B-C50C-407E-A947-70E740481C1C}">
+                <a14:useLocalDpi xmlns:a14="http://schemas.microsoft.com/office/drawing/2010/main" val="0"/>
+              </a:ext>
+            </a:extLst>
+          </a:blip>
+          <a:stretch>
+            <a:fillRect/>
+          </a:stretch>
+        </p:blipFill>
+        <p:spPr>
+          <a:xfrm>
+            <a:off x="10520161" y="3742659"/>
+            <a:ext cx="1509486" cy="849086"/>
+          </a:xfrm>
+          <a:prstGeom prst="rect">
+            <a:avLst/>
+          </a:prstGeom>
+        </p:spPr>
+      </p:pic>
     </p:spTree>
     <p:extLst>
       <p:ext uri="{BB962C8B-B14F-4D97-AF65-F5344CB8AC3E}">

</xml_diff>

<commit_message>
kickoff session - ppt
</commit_message>
<xml_diff>
--- a/Fraud_review_detection_web_app_ProjectPlan.pptx
+++ b/Fraud_review_detection_web_app_ProjectPlan.pptx
@@ -32656,6 +32656,13 @@
   <p:clrMapOvr>
     <a:masterClrMapping/>
   </p:clrMapOvr>
+  <p:timing>
+    <p:tnLst>
+      <p:par>
+        <p:cTn id="1" dur="indefinite" restart="never" nodeType="tmRoot"/>
+      </p:par>
+    </p:tnLst>
+  </p:timing>
 </p:sld>
 </file>
 
@@ -35228,7 +35235,7 @@
         </p:spPr>
         <p:txBody>
           <a:bodyPr>
-            <a:normAutofit/>
+            <a:normAutofit fontScale="92500" lnSpcReduction="20000"/>
           </a:bodyPr>
           <a:lstStyle/>
           <a:p>
@@ -35255,8 +35262,23 @@
           <a:p>
             <a:r>
               <a:rPr lang="en-US" dirty="0"/>
-              <a:t>Page for pasting the review &amp; get the result</a:t>
+              <a:t>Page for pasting the review &amp; get the </a:t>
             </a:r>
+            <a:r>
+              <a:rPr lang="en-US" dirty="0" smtClean="0"/>
+              <a:t>result</a:t>
+            </a:r>
+          </a:p>
+          <a:p>
+            <a:r>
+              <a:rPr lang="en-US" dirty="0" smtClean="0"/>
+              <a:t>Page to review the user </a:t>
+            </a:r>
+            <a:r>
+              <a:rPr lang="en-US" smtClean="0"/>
+              <a:t>historical activities</a:t>
+            </a:r>
+            <a:endParaRPr lang="en-US" dirty="0"/>
           </a:p>
         </p:txBody>
       </p:sp>
@@ -35395,6 +35417,13 @@
   <p:clrMapOvr>
     <a:masterClrMapping/>
   </p:clrMapOvr>
+  <p:timing>
+    <p:tnLst>
+      <p:par>
+        <p:cTn id="1" dur="indefinite" restart="never" nodeType="tmRoot"/>
+      </p:par>
+    </p:tnLst>
+  </p:timing>
 </p:sld>
 </file>
 
@@ -35805,6 +35834,13 @@
   <p:clrMapOvr>
     <a:masterClrMapping/>
   </p:clrMapOvr>
+  <p:timing>
+    <p:tnLst>
+      <p:par>
+        <p:cTn id="1" dur="indefinite" restart="never" nodeType="tmRoot"/>
+      </p:par>
+    </p:tnLst>
+  </p:timing>
 </p:sld>
 </file>
 
@@ -36695,6 +36731,13 @@
   <p:clrMapOvr>
     <a:masterClrMapping/>
   </p:clrMapOvr>
+  <p:timing>
+    <p:tnLst>
+      <p:par>
+        <p:cTn id="1" dur="indefinite" restart="never" nodeType="tmRoot"/>
+      </p:par>
+    </p:tnLst>
+  </p:timing>
 </p:sld>
 </file>
 

</xml_diff>